<commit_message>
Updates for the DAY 2
</commit_message>
<xml_diff>
--- a/Introduction/intro_slides.pptx
+++ b/Introduction/intro_slides.pptx
@@ -1,26 +1,121 @@
 
 <file path=ppt/presentation.xml><?xml version="1.0" encoding="utf-8"?>
-<p:presentation xmlns:a="http://schemas.openxmlformats.org/drawingml/2006/main" xmlns:p="http://schemas.openxmlformats.org/presentationml/2006/main" xmlns:r="http://schemas.openxmlformats.org/officeDocument/2006/relationships">
+<p:presentation xmlns:a="http://schemas.openxmlformats.org/drawingml/2006/main" xmlns:r="http://schemas.openxmlformats.org/officeDocument/2006/relationships" xmlns:p="http://schemas.openxmlformats.org/presentationml/2006/main">
   <p:sldMasterIdLst>
-    <p:sldMasterId id="2147483648" r:id="rId2"/>
+    <p:sldMasterId id="2147483648" r:id="rId1"/>
   </p:sldMasterIdLst>
   <p:sldIdLst>
-    <p:sldId id="256" r:id="rId3"/>
-    <p:sldId id="257" r:id="rId4"/>
-    <p:sldId id="258" r:id="rId5"/>
-    <p:sldId id="259" r:id="rId6"/>
-    <p:sldId id="260" r:id="rId7"/>
-    <p:sldId id="261" r:id="rId8"/>
-    <p:sldId id="262" r:id="rId9"/>
-    <p:sldId id="263" r:id="rId10"/>
+    <p:sldId id="256" r:id="rId2"/>
+    <p:sldId id="257" r:id="rId3"/>
+    <p:sldId id="258" r:id="rId4"/>
+    <p:sldId id="259" r:id="rId5"/>
+    <p:sldId id="260" r:id="rId6"/>
+    <p:sldId id="261" r:id="rId7"/>
+    <p:sldId id="262" r:id="rId8"/>
+    <p:sldId id="263" r:id="rId9"/>
   </p:sldIdLst>
-  <p:sldSz cx="9144000" cy="6858000"/>
+  <p:sldSz cx="9144000" cy="6858000" type="screen4x3"/>
   <p:notesSz cx="7772400" cy="10058400"/>
+  <p:defaultTextStyle>
+    <a:defPPr>
+      <a:defRPr lang="en-US"/>
+    </a:defPPr>
+    <a:lvl1pPr marL="0" algn="l" defTabSz="914400" rtl="0" eaLnBrk="1" latinLnBrk="0" hangingPunct="1">
+      <a:defRPr sz="1800" kern="1200">
+        <a:solidFill>
+          <a:schemeClr val="tx1"/>
+        </a:solidFill>
+        <a:latin typeface="+mn-lt"/>
+        <a:ea typeface="+mn-ea"/>
+        <a:cs typeface="+mn-cs"/>
+      </a:defRPr>
+    </a:lvl1pPr>
+    <a:lvl2pPr marL="457200" algn="l" defTabSz="914400" rtl="0" eaLnBrk="1" latinLnBrk="0" hangingPunct="1">
+      <a:defRPr sz="1800" kern="1200">
+        <a:solidFill>
+          <a:schemeClr val="tx1"/>
+        </a:solidFill>
+        <a:latin typeface="+mn-lt"/>
+        <a:ea typeface="+mn-ea"/>
+        <a:cs typeface="+mn-cs"/>
+      </a:defRPr>
+    </a:lvl2pPr>
+    <a:lvl3pPr marL="914400" algn="l" defTabSz="914400" rtl="0" eaLnBrk="1" latinLnBrk="0" hangingPunct="1">
+      <a:defRPr sz="1800" kern="1200">
+        <a:solidFill>
+          <a:schemeClr val="tx1"/>
+        </a:solidFill>
+        <a:latin typeface="+mn-lt"/>
+        <a:ea typeface="+mn-ea"/>
+        <a:cs typeface="+mn-cs"/>
+      </a:defRPr>
+    </a:lvl3pPr>
+    <a:lvl4pPr marL="1371600" algn="l" defTabSz="914400" rtl="0" eaLnBrk="1" latinLnBrk="0" hangingPunct="1">
+      <a:defRPr sz="1800" kern="1200">
+        <a:solidFill>
+          <a:schemeClr val="tx1"/>
+        </a:solidFill>
+        <a:latin typeface="+mn-lt"/>
+        <a:ea typeface="+mn-ea"/>
+        <a:cs typeface="+mn-cs"/>
+      </a:defRPr>
+    </a:lvl4pPr>
+    <a:lvl5pPr marL="1828800" algn="l" defTabSz="914400" rtl="0" eaLnBrk="1" latinLnBrk="0" hangingPunct="1">
+      <a:defRPr sz="1800" kern="1200">
+        <a:solidFill>
+          <a:schemeClr val="tx1"/>
+        </a:solidFill>
+        <a:latin typeface="+mn-lt"/>
+        <a:ea typeface="+mn-ea"/>
+        <a:cs typeface="+mn-cs"/>
+      </a:defRPr>
+    </a:lvl5pPr>
+    <a:lvl6pPr marL="2286000" algn="l" defTabSz="914400" rtl="0" eaLnBrk="1" latinLnBrk="0" hangingPunct="1">
+      <a:defRPr sz="1800" kern="1200">
+        <a:solidFill>
+          <a:schemeClr val="tx1"/>
+        </a:solidFill>
+        <a:latin typeface="+mn-lt"/>
+        <a:ea typeface="+mn-ea"/>
+        <a:cs typeface="+mn-cs"/>
+      </a:defRPr>
+    </a:lvl6pPr>
+    <a:lvl7pPr marL="2743200" algn="l" defTabSz="914400" rtl="0" eaLnBrk="1" latinLnBrk="0" hangingPunct="1">
+      <a:defRPr sz="1800" kern="1200">
+        <a:solidFill>
+          <a:schemeClr val="tx1"/>
+        </a:solidFill>
+        <a:latin typeface="+mn-lt"/>
+        <a:ea typeface="+mn-ea"/>
+        <a:cs typeface="+mn-cs"/>
+      </a:defRPr>
+    </a:lvl7pPr>
+    <a:lvl8pPr marL="3200400" algn="l" defTabSz="914400" rtl="0" eaLnBrk="1" latinLnBrk="0" hangingPunct="1">
+      <a:defRPr sz="1800" kern="1200">
+        <a:solidFill>
+          <a:schemeClr val="tx1"/>
+        </a:solidFill>
+        <a:latin typeface="+mn-lt"/>
+        <a:ea typeface="+mn-ea"/>
+        <a:cs typeface="+mn-cs"/>
+      </a:defRPr>
+    </a:lvl8pPr>
+    <a:lvl9pPr marL="3657600" algn="l" defTabSz="914400" rtl="0" eaLnBrk="1" latinLnBrk="0" hangingPunct="1">
+      <a:defRPr sz="1800" kern="1200">
+        <a:solidFill>
+          <a:schemeClr val="tx1"/>
+        </a:solidFill>
+        <a:latin typeface="+mn-lt"/>
+        <a:ea typeface="+mn-ea"/>
+        <a:cs typeface="+mn-cs"/>
+      </a:defRPr>
+    </a:lvl9pPr>
+  </p:defaultTextStyle>
 </p:presentation>
 </file>
 
 <file path=ppt/slideLayouts/slideLayout1.xml><?xml version="1.0" encoding="utf-8"?>
-<p:sldLayout xmlns:a="http://schemas.openxmlformats.org/drawingml/2006/main" xmlns:p="http://schemas.openxmlformats.org/presentationml/2006/main" xmlns:r="http://schemas.openxmlformats.org/officeDocument/2006/relationships" type="blank" preserve="1">
+<p:sldLayout xmlns:a="http://schemas.openxmlformats.org/drawingml/2006/main" xmlns:r="http://schemas.openxmlformats.org/officeDocument/2006/relationships" xmlns:p="http://schemas.openxmlformats.org/presentationml/2006/main" type="blank" preserve="1">
   <p:cSld name="Blank Slide">
     <p:spTree>
       <p:nvGrpSpPr>
@@ -38,11 +133,14 @@
       </p:grpSpPr>
     </p:spTree>
   </p:cSld>
+  <p:clrMapOvr>
+    <a:masterClrMapping/>
+  </p:clrMapOvr>
 </p:sldLayout>
 </file>
 
 <file path=ppt/slideLayouts/slideLayout10.xml><?xml version="1.0" encoding="utf-8"?>
-<p:sldLayout xmlns:a="http://schemas.openxmlformats.org/drawingml/2006/main" xmlns:p="http://schemas.openxmlformats.org/presentationml/2006/main" xmlns:r="http://schemas.openxmlformats.org/officeDocument/2006/relationships" type="objOverTx" preserve="1">
+<p:sldLayout xmlns:a="http://schemas.openxmlformats.org/drawingml/2006/main" xmlns:r="http://schemas.openxmlformats.org/officeDocument/2006/relationships" xmlns:p="http://schemas.openxmlformats.org/presentationml/2006/main" type="objOverTx" preserve="1">
   <p:cSld name="Title, Content over Content">
     <p:spTree>
       <p:nvGrpSpPr>
@@ -78,7 +176,8 @@
           </a:prstGeom>
         </p:spPr>
         <p:txBody>
-          <a:bodyPr lIns="0" rIns="0" tIns="0" bIns="0" anchor="ctr"/>
+          <a:bodyPr lIns="0" tIns="0" rIns="0" bIns="0" anchor="ctr"/>
+          <a:lstStyle/>
           <a:p>
             <a:endParaRPr/>
           </a:p>
@@ -104,7 +203,8 @@
           </a:prstGeom>
         </p:spPr>
         <p:txBody>
-          <a:bodyPr lIns="0" rIns="0" tIns="0" bIns="0"/>
+          <a:bodyPr lIns="0" tIns="0" rIns="0" bIns="0"/>
+          <a:lstStyle/>
           <a:p>
             <a:endParaRPr/>
           </a:p>
@@ -130,7 +230,8 @@
           </a:prstGeom>
         </p:spPr>
         <p:txBody>
-          <a:bodyPr lIns="0" rIns="0" tIns="0" bIns="0"/>
+          <a:bodyPr lIns="0" tIns="0" rIns="0" bIns="0"/>
+          <a:lstStyle/>
           <a:p>
             <a:endParaRPr/>
           </a:p>
@@ -138,11 +239,14 @@
       </p:sp>
     </p:spTree>
   </p:cSld>
+  <p:clrMapOvr>
+    <a:masterClrMapping/>
+  </p:clrMapOvr>
 </p:sldLayout>
 </file>
 
 <file path=ppt/slideLayouts/slideLayout11.xml><?xml version="1.0" encoding="utf-8"?>
-<p:sldLayout xmlns:a="http://schemas.openxmlformats.org/drawingml/2006/main" xmlns:p="http://schemas.openxmlformats.org/presentationml/2006/main" xmlns:r="http://schemas.openxmlformats.org/officeDocument/2006/relationships" type="fourObj" preserve="1">
+<p:sldLayout xmlns:a="http://schemas.openxmlformats.org/drawingml/2006/main" xmlns:r="http://schemas.openxmlformats.org/officeDocument/2006/relationships" xmlns:p="http://schemas.openxmlformats.org/presentationml/2006/main" type="fourObj" preserve="1">
   <p:cSld name="Title, 4 Content">
     <p:spTree>
       <p:nvGrpSpPr>
@@ -178,7 +282,8 @@
           </a:prstGeom>
         </p:spPr>
         <p:txBody>
-          <a:bodyPr lIns="0" rIns="0" tIns="0" bIns="0" anchor="ctr"/>
+          <a:bodyPr lIns="0" tIns="0" rIns="0" bIns="0" anchor="ctr"/>
+          <a:lstStyle/>
           <a:p>
             <a:endParaRPr/>
           </a:p>
@@ -204,7 +309,8 @@
           </a:prstGeom>
         </p:spPr>
         <p:txBody>
-          <a:bodyPr lIns="0" rIns="0" tIns="0" bIns="0"/>
+          <a:bodyPr lIns="0" tIns="0" rIns="0" bIns="0"/>
+          <a:lstStyle/>
           <a:p>
             <a:endParaRPr/>
           </a:p>
@@ -230,7 +336,8 @@
           </a:prstGeom>
         </p:spPr>
         <p:txBody>
-          <a:bodyPr lIns="0" rIns="0" tIns="0" bIns="0"/>
+          <a:bodyPr lIns="0" tIns="0" rIns="0" bIns="0"/>
+          <a:lstStyle/>
           <a:p>
             <a:endParaRPr/>
           </a:p>
@@ -256,7 +363,8 @@
           </a:prstGeom>
         </p:spPr>
         <p:txBody>
-          <a:bodyPr lIns="0" rIns="0" tIns="0" bIns="0"/>
+          <a:bodyPr lIns="0" tIns="0" rIns="0" bIns="0"/>
+          <a:lstStyle/>
           <a:p>
             <a:endParaRPr/>
           </a:p>
@@ -282,7 +390,8 @@
           </a:prstGeom>
         </p:spPr>
         <p:txBody>
-          <a:bodyPr lIns="0" rIns="0" tIns="0" bIns="0"/>
+          <a:bodyPr lIns="0" tIns="0" rIns="0" bIns="0"/>
+          <a:lstStyle/>
           <a:p>
             <a:endParaRPr/>
           </a:p>
@@ -290,11 +399,14 @@
       </p:sp>
     </p:spTree>
   </p:cSld>
+  <p:clrMapOvr>
+    <a:masterClrMapping/>
+  </p:clrMapOvr>
 </p:sldLayout>
 </file>
 
 <file path=ppt/slideLayouts/slideLayout12.xml><?xml version="1.0" encoding="utf-8"?>
-<p:sldLayout xmlns:a="http://schemas.openxmlformats.org/drawingml/2006/main" xmlns:p="http://schemas.openxmlformats.org/presentationml/2006/main" xmlns:r="http://schemas.openxmlformats.org/officeDocument/2006/relationships" type="blank" preserve="1">
+<p:sldLayout xmlns:a="http://schemas.openxmlformats.org/drawingml/2006/main" xmlns:r="http://schemas.openxmlformats.org/officeDocument/2006/relationships" xmlns:p="http://schemas.openxmlformats.org/presentationml/2006/main" type="blank" preserve="1">
   <p:cSld name="Title, 6 Content">
     <p:spTree>
       <p:nvGrpSpPr>
@@ -330,7 +442,8 @@
           </a:prstGeom>
         </p:spPr>
         <p:txBody>
-          <a:bodyPr lIns="0" rIns="0" tIns="0" bIns="0" anchor="ctr"/>
+          <a:bodyPr lIns="0" tIns="0" rIns="0" bIns="0" anchor="ctr"/>
+          <a:lstStyle/>
           <a:p>
             <a:endParaRPr/>
           </a:p>
@@ -356,7 +469,8 @@
           </a:prstGeom>
         </p:spPr>
         <p:txBody>
-          <a:bodyPr lIns="0" rIns="0" tIns="0" bIns="0"/>
+          <a:bodyPr lIns="0" tIns="0" rIns="0" bIns="0"/>
+          <a:lstStyle/>
           <a:p>
             <a:endParaRPr/>
           </a:p>
@@ -382,7 +496,8 @@
           </a:prstGeom>
         </p:spPr>
         <p:txBody>
-          <a:bodyPr lIns="0" rIns="0" tIns="0" bIns="0"/>
+          <a:bodyPr lIns="0" tIns="0" rIns="0" bIns="0"/>
+          <a:lstStyle/>
           <a:p>
             <a:endParaRPr/>
           </a:p>
@@ -390,7 +505,7 @@
       </p:sp>
       <p:pic>
         <p:nvPicPr>
-          <p:cNvPr id="37" name="" descr=""/>
+          <p:cNvPr id="37" name="Picture 36"/>
           <p:cNvPicPr/>
           <p:nvPr/>
         </p:nvPicPr>
@@ -415,12 +530,12 @@
       </p:pic>
       <p:pic>
         <p:nvPicPr>
-          <p:cNvPr id="38" name="" descr=""/>
+          <p:cNvPr id="38" name="Picture 37"/>
           <p:cNvPicPr/>
           <p:nvPr/>
         </p:nvPicPr>
         <p:blipFill>
-          <a:blip r:embed="rId3"/>
+          <a:blip r:embed="rId2"/>
           <a:stretch>
             <a:fillRect/>
           </a:stretch>
@@ -440,11 +555,14 @@
       </p:pic>
     </p:spTree>
   </p:cSld>
+  <p:clrMapOvr>
+    <a:masterClrMapping/>
+  </p:clrMapOvr>
 </p:sldLayout>
 </file>
 
 <file path=ppt/slideLayouts/slideLayout2.xml><?xml version="1.0" encoding="utf-8"?>
-<p:sldLayout xmlns:a="http://schemas.openxmlformats.org/drawingml/2006/main" xmlns:p="http://schemas.openxmlformats.org/presentationml/2006/main" xmlns:r="http://schemas.openxmlformats.org/officeDocument/2006/relationships" type="tx" preserve="1">
+<p:sldLayout xmlns:a="http://schemas.openxmlformats.org/drawingml/2006/main" xmlns:r="http://schemas.openxmlformats.org/officeDocument/2006/relationships" xmlns:p="http://schemas.openxmlformats.org/presentationml/2006/main" type="tx" preserve="1">
   <p:cSld name="Title Slide">
     <p:spTree>
       <p:nvGrpSpPr>
@@ -480,7 +598,8 @@
           </a:prstGeom>
         </p:spPr>
         <p:txBody>
-          <a:bodyPr lIns="0" rIns="0" tIns="0" bIns="0" anchor="ctr"/>
+          <a:bodyPr lIns="0" tIns="0" rIns="0" bIns="0" anchor="ctr"/>
+          <a:lstStyle/>
           <a:p>
             <a:endParaRPr/>
           </a:p>
@@ -506,7 +625,8 @@
           </a:prstGeom>
         </p:spPr>
         <p:txBody>
-          <a:bodyPr lIns="0" rIns="0" tIns="0" bIns="0" anchor="ctr"/>
+          <a:bodyPr lIns="0" tIns="0" rIns="0" bIns="0" anchor="ctr"/>
+          <a:lstStyle/>
           <a:p>
             <a:pPr algn="ctr"/>
             <a:endParaRPr/>
@@ -515,11 +635,14 @@
       </p:sp>
     </p:spTree>
   </p:cSld>
+  <p:clrMapOvr>
+    <a:masterClrMapping/>
+  </p:clrMapOvr>
 </p:sldLayout>
 </file>
 
 <file path=ppt/slideLayouts/slideLayout3.xml><?xml version="1.0" encoding="utf-8"?>
-<p:sldLayout xmlns:a="http://schemas.openxmlformats.org/drawingml/2006/main" xmlns:p="http://schemas.openxmlformats.org/presentationml/2006/main" xmlns:r="http://schemas.openxmlformats.org/officeDocument/2006/relationships" type="obj" preserve="1">
+<p:sldLayout xmlns:a="http://schemas.openxmlformats.org/drawingml/2006/main" xmlns:r="http://schemas.openxmlformats.org/officeDocument/2006/relationships" xmlns:p="http://schemas.openxmlformats.org/presentationml/2006/main" type="obj" preserve="1">
   <p:cSld name="Title, Content">
     <p:spTree>
       <p:nvGrpSpPr>
@@ -555,7 +678,8 @@
           </a:prstGeom>
         </p:spPr>
         <p:txBody>
-          <a:bodyPr lIns="0" rIns="0" tIns="0" bIns="0" anchor="ctr"/>
+          <a:bodyPr lIns="0" tIns="0" rIns="0" bIns="0" anchor="ctr"/>
+          <a:lstStyle/>
           <a:p>
             <a:endParaRPr/>
           </a:p>
@@ -581,7 +705,8 @@
           </a:prstGeom>
         </p:spPr>
         <p:txBody>
-          <a:bodyPr lIns="0" rIns="0" tIns="0" bIns="0"/>
+          <a:bodyPr lIns="0" tIns="0" rIns="0" bIns="0"/>
+          <a:lstStyle/>
           <a:p>
             <a:endParaRPr/>
           </a:p>
@@ -589,11 +714,14 @@
       </p:sp>
     </p:spTree>
   </p:cSld>
+  <p:clrMapOvr>
+    <a:masterClrMapping/>
+  </p:clrMapOvr>
 </p:sldLayout>
 </file>
 
 <file path=ppt/slideLayouts/slideLayout4.xml><?xml version="1.0" encoding="utf-8"?>
-<p:sldLayout xmlns:a="http://schemas.openxmlformats.org/drawingml/2006/main" xmlns:p="http://schemas.openxmlformats.org/presentationml/2006/main" xmlns:r="http://schemas.openxmlformats.org/officeDocument/2006/relationships" type="twoObj" preserve="1">
+<p:sldLayout xmlns:a="http://schemas.openxmlformats.org/drawingml/2006/main" xmlns:r="http://schemas.openxmlformats.org/officeDocument/2006/relationships" xmlns:p="http://schemas.openxmlformats.org/presentationml/2006/main" type="twoObj" preserve="1">
   <p:cSld name="Title, 2 Content">
     <p:spTree>
       <p:nvGrpSpPr>
@@ -629,7 +757,8 @@
           </a:prstGeom>
         </p:spPr>
         <p:txBody>
-          <a:bodyPr lIns="0" rIns="0" tIns="0" bIns="0" anchor="ctr"/>
+          <a:bodyPr lIns="0" tIns="0" rIns="0" bIns="0" anchor="ctr"/>
+          <a:lstStyle/>
           <a:p>
             <a:endParaRPr/>
           </a:p>
@@ -655,7 +784,8 @@
           </a:prstGeom>
         </p:spPr>
         <p:txBody>
-          <a:bodyPr lIns="0" rIns="0" tIns="0" bIns="0"/>
+          <a:bodyPr lIns="0" tIns="0" rIns="0" bIns="0"/>
+          <a:lstStyle/>
           <a:p>
             <a:endParaRPr/>
           </a:p>
@@ -681,7 +811,8 @@
           </a:prstGeom>
         </p:spPr>
         <p:txBody>
-          <a:bodyPr lIns="0" rIns="0" tIns="0" bIns="0"/>
+          <a:bodyPr lIns="0" tIns="0" rIns="0" bIns="0"/>
+          <a:lstStyle/>
           <a:p>
             <a:endParaRPr/>
           </a:p>
@@ -689,11 +820,14 @@
       </p:sp>
     </p:spTree>
   </p:cSld>
+  <p:clrMapOvr>
+    <a:masterClrMapping/>
+  </p:clrMapOvr>
 </p:sldLayout>
 </file>
 
 <file path=ppt/slideLayouts/slideLayout5.xml><?xml version="1.0" encoding="utf-8"?>
-<p:sldLayout xmlns:a="http://schemas.openxmlformats.org/drawingml/2006/main" xmlns:p="http://schemas.openxmlformats.org/presentationml/2006/main" xmlns:r="http://schemas.openxmlformats.org/officeDocument/2006/relationships" type="titleOnly" preserve="1">
+<p:sldLayout xmlns:a="http://schemas.openxmlformats.org/drawingml/2006/main" xmlns:r="http://schemas.openxmlformats.org/officeDocument/2006/relationships" xmlns:p="http://schemas.openxmlformats.org/presentationml/2006/main" type="titleOnly" preserve="1">
   <p:cSld name="Title Only">
     <p:spTree>
       <p:nvGrpSpPr>
@@ -729,7 +863,8 @@
           </a:prstGeom>
         </p:spPr>
         <p:txBody>
-          <a:bodyPr lIns="0" rIns="0" tIns="0" bIns="0" anchor="ctr"/>
+          <a:bodyPr lIns="0" tIns="0" rIns="0" bIns="0" anchor="ctr"/>
+          <a:lstStyle/>
           <a:p>
             <a:endParaRPr/>
           </a:p>
@@ -737,11 +872,14 @@
       </p:sp>
     </p:spTree>
   </p:cSld>
+  <p:clrMapOvr>
+    <a:masterClrMapping/>
+  </p:clrMapOvr>
 </p:sldLayout>
 </file>
 
 <file path=ppt/slideLayouts/slideLayout6.xml><?xml version="1.0" encoding="utf-8"?>
-<p:sldLayout xmlns:a="http://schemas.openxmlformats.org/drawingml/2006/main" xmlns:p="http://schemas.openxmlformats.org/presentationml/2006/main" xmlns:r="http://schemas.openxmlformats.org/officeDocument/2006/relationships" type="objOnly" preserve="1">
+<p:sldLayout xmlns:a="http://schemas.openxmlformats.org/drawingml/2006/main" xmlns:r="http://schemas.openxmlformats.org/officeDocument/2006/relationships" xmlns:p="http://schemas.openxmlformats.org/presentationml/2006/main" type="objOnly" preserve="1">
   <p:cSld name="Centered Text">
     <p:spTree>
       <p:nvGrpSpPr>
@@ -777,7 +915,8 @@
           </a:prstGeom>
         </p:spPr>
         <p:txBody>
-          <a:bodyPr lIns="0" rIns="0" tIns="0" bIns="0" anchor="ctr"/>
+          <a:bodyPr lIns="0" tIns="0" rIns="0" bIns="0" anchor="ctr"/>
+          <a:lstStyle/>
           <a:p>
             <a:pPr algn="ctr"/>
             <a:endParaRPr/>
@@ -786,11 +925,14 @@
       </p:sp>
     </p:spTree>
   </p:cSld>
+  <p:clrMapOvr>
+    <a:masterClrMapping/>
+  </p:clrMapOvr>
 </p:sldLayout>
 </file>
 
 <file path=ppt/slideLayouts/slideLayout7.xml><?xml version="1.0" encoding="utf-8"?>
-<p:sldLayout xmlns:a="http://schemas.openxmlformats.org/drawingml/2006/main" xmlns:p="http://schemas.openxmlformats.org/presentationml/2006/main" xmlns:r="http://schemas.openxmlformats.org/officeDocument/2006/relationships" type="twoObjAndObj" preserve="1">
+<p:sldLayout xmlns:a="http://schemas.openxmlformats.org/drawingml/2006/main" xmlns:r="http://schemas.openxmlformats.org/officeDocument/2006/relationships" xmlns:p="http://schemas.openxmlformats.org/presentationml/2006/main" type="twoObjAndObj" preserve="1">
   <p:cSld name="Title, 2 Content and Content">
     <p:spTree>
       <p:nvGrpSpPr>
@@ -826,7 +968,8 @@
           </a:prstGeom>
         </p:spPr>
         <p:txBody>
-          <a:bodyPr lIns="0" rIns="0" tIns="0" bIns="0" anchor="ctr"/>
+          <a:bodyPr lIns="0" tIns="0" rIns="0" bIns="0" anchor="ctr"/>
+          <a:lstStyle/>
           <a:p>
             <a:endParaRPr/>
           </a:p>
@@ -852,7 +995,8 @@
           </a:prstGeom>
         </p:spPr>
         <p:txBody>
-          <a:bodyPr lIns="0" rIns="0" tIns="0" bIns="0"/>
+          <a:bodyPr lIns="0" tIns="0" rIns="0" bIns="0"/>
+          <a:lstStyle/>
           <a:p>
             <a:endParaRPr/>
           </a:p>
@@ -878,7 +1022,8 @@
           </a:prstGeom>
         </p:spPr>
         <p:txBody>
-          <a:bodyPr lIns="0" rIns="0" tIns="0" bIns="0"/>
+          <a:bodyPr lIns="0" tIns="0" rIns="0" bIns="0"/>
+          <a:lstStyle/>
           <a:p>
             <a:endParaRPr/>
           </a:p>
@@ -904,7 +1049,8 @@
           </a:prstGeom>
         </p:spPr>
         <p:txBody>
-          <a:bodyPr lIns="0" rIns="0" tIns="0" bIns="0"/>
+          <a:bodyPr lIns="0" tIns="0" rIns="0" bIns="0"/>
+          <a:lstStyle/>
           <a:p>
             <a:endParaRPr/>
           </a:p>
@@ -912,11 +1058,14 @@
       </p:sp>
     </p:spTree>
   </p:cSld>
+  <p:clrMapOvr>
+    <a:masterClrMapping/>
+  </p:clrMapOvr>
 </p:sldLayout>
 </file>
 
 <file path=ppt/slideLayouts/slideLayout8.xml><?xml version="1.0" encoding="utf-8"?>
-<p:sldLayout xmlns:a="http://schemas.openxmlformats.org/drawingml/2006/main" xmlns:p="http://schemas.openxmlformats.org/presentationml/2006/main" xmlns:r="http://schemas.openxmlformats.org/officeDocument/2006/relationships" type="objAndTwoObj" preserve="1">
+<p:sldLayout xmlns:a="http://schemas.openxmlformats.org/drawingml/2006/main" xmlns:r="http://schemas.openxmlformats.org/officeDocument/2006/relationships" xmlns:p="http://schemas.openxmlformats.org/presentationml/2006/main" type="objAndTwoObj" preserve="1">
   <p:cSld name="Title Content and 2 Content">
     <p:spTree>
       <p:nvGrpSpPr>
@@ -952,7 +1101,8 @@
           </a:prstGeom>
         </p:spPr>
         <p:txBody>
-          <a:bodyPr lIns="0" rIns="0" tIns="0" bIns="0" anchor="ctr"/>
+          <a:bodyPr lIns="0" tIns="0" rIns="0" bIns="0" anchor="ctr"/>
+          <a:lstStyle/>
           <a:p>
             <a:endParaRPr/>
           </a:p>
@@ -978,7 +1128,8 @@
           </a:prstGeom>
         </p:spPr>
         <p:txBody>
-          <a:bodyPr lIns="0" rIns="0" tIns="0" bIns="0"/>
+          <a:bodyPr lIns="0" tIns="0" rIns="0" bIns="0"/>
+          <a:lstStyle/>
           <a:p>
             <a:endParaRPr/>
           </a:p>
@@ -1004,7 +1155,8 @@
           </a:prstGeom>
         </p:spPr>
         <p:txBody>
-          <a:bodyPr lIns="0" rIns="0" tIns="0" bIns="0"/>
+          <a:bodyPr lIns="0" tIns="0" rIns="0" bIns="0"/>
+          <a:lstStyle/>
           <a:p>
             <a:endParaRPr/>
           </a:p>
@@ -1030,7 +1182,8 @@
           </a:prstGeom>
         </p:spPr>
         <p:txBody>
-          <a:bodyPr lIns="0" rIns="0" tIns="0" bIns="0"/>
+          <a:bodyPr lIns="0" tIns="0" rIns="0" bIns="0"/>
+          <a:lstStyle/>
           <a:p>
             <a:endParaRPr/>
           </a:p>
@@ -1038,11 +1191,14 @@
       </p:sp>
     </p:spTree>
   </p:cSld>
+  <p:clrMapOvr>
+    <a:masterClrMapping/>
+  </p:clrMapOvr>
 </p:sldLayout>
 </file>
 
 <file path=ppt/slideLayouts/slideLayout9.xml><?xml version="1.0" encoding="utf-8"?>
-<p:sldLayout xmlns:a="http://schemas.openxmlformats.org/drawingml/2006/main" xmlns:p="http://schemas.openxmlformats.org/presentationml/2006/main" xmlns:r="http://schemas.openxmlformats.org/officeDocument/2006/relationships" type="twoObjOverTx" preserve="1">
+<p:sldLayout xmlns:a="http://schemas.openxmlformats.org/drawingml/2006/main" xmlns:r="http://schemas.openxmlformats.org/officeDocument/2006/relationships" xmlns:p="http://schemas.openxmlformats.org/presentationml/2006/main" type="twoObjOverTx" preserve="1">
   <p:cSld name="Title, 2 Content over Content">
     <p:spTree>
       <p:nvGrpSpPr>
@@ -1078,7 +1234,8 @@
           </a:prstGeom>
         </p:spPr>
         <p:txBody>
-          <a:bodyPr lIns="0" rIns="0" tIns="0" bIns="0" anchor="ctr"/>
+          <a:bodyPr lIns="0" tIns="0" rIns="0" bIns="0" anchor="ctr"/>
+          <a:lstStyle/>
           <a:p>
             <a:endParaRPr/>
           </a:p>
@@ -1104,7 +1261,8 @@
           </a:prstGeom>
         </p:spPr>
         <p:txBody>
-          <a:bodyPr lIns="0" rIns="0" tIns="0" bIns="0"/>
+          <a:bodyPr lIns="0" tIns="0" rIns="0" bIns="0"/>
+          <a:lstStyle/>
           <a:p>
             <a:endParaRPr/>
           </a:p>
@@ -1130,7 +1288,8 @@
           </a:prstGeom>
         </p:spPr>
         <p:txBody>
-          <a:bodyPr lIns="0" rIns="0" tIns="0" bIns="0"/>
+          <a:bodyPr lIns="0" tIns="0" rIns="0" bIns="0"/>
+          <a:lstStyle/>
           <a:p>
             <a:endParaRPr/>
           </a:p>
@@ -1156,7 +1315,8 @@
           </a:prstGeom>
         </p:spPr>
         <p:txBody>
-          <a:bodyPr lIns="0" rIns="0" tIns="0" bIns="0"/>
+          <a:bodyPr lIns="0" tIns="0" rIns="0" bIns="0"/>
+          <a:lstStyle/>
           <a:p>
             <a:endParaRPr/>
           </a:p>
@@ -1164,17 +1324,21 @@
       </p:sp>
     </p:spTree>
   </p:cSld>
+  <p:clrMapOvr>
+    <a:masterClrMapping/>
+  </p:clrMapOvr>
 </p:sldLayout>
 </file>
 
 <file path=ppt/slideMasters/slideMaster1.xml><?xml version="1.0" encoding="utf-8"?>
-<p:sldMaster xmlns:a="http://schemas.openxmlformats.org/drawingml/2006/main" xmlns:p="http://schemas.openxmlformats.org/presentationml/2006/main" xmlns:r="http://schemas.openxmlformats.org/officeDocument/2006/relationships">
+<p:sldMaster xmlns:a="http://schemas.openxmlformats.org/drawingml/2006/main" xmlns:r="http://schemas.openxmlformats.org/officeDocument/2006/relationships" xmlns:p="http://schemas.openxmlformats.org/presentationml/2006/main">
   <p:cSld>
     <p:bg>
       <p:bgPr>
         <a:solidFill>
-          <a:srgbClr val="ffffff"/>
+          <a:srgbClr val="FFFFFF"/>
         </a:solidFill>
+        <a:effectLst/>
       </p:bgPr>
     </p:bg>
     <p:spTree>
@@ -1193,7 +1357,7 @@
       </p:grpSpPr>
       <p:sp>
         <p:nvSpPr>
-          <p:cNvPr id="0" name="PlaceHolder 1"/>
+          <p:cNvPr id="5" name="PlaceHolder 1"/>
           <p:cNvSpPr>
             <a:spLocks noGrp="1"/>
           </p:cNvSpPr>
@@ -1212,6 +1376,7 @@
         </p:spPr>
         <p:txBody>
           <a:bodyPr anchor="ctr"/>
+          <a:lstStyle/>
           <a:p>
             <a:pPr algn="ctr">
               <a:lnSpc>
@@ -1233,7 +1398,7 @@
       </p:sp>
       <p:sp>
         <p:nvSpPr>
-          <p:cNvPr id="1" name="PlaceHolder 2"/>
+          <p:cNvPr id="6" name="PlaceHolder 2"/>
           <p:cNvSpPr>
             <a:spLocks noGrp="1"/>
           </p:cNvSpPr>
@@ -1252,6 +1417,7 @@
         </p:spPr>
         <p:txBody>
           <a:bodyPr anchor="ctr"/>
+          <a:lstStyle/>
           <a:p>
             <a:pPr>
               <a:lnSpc>
@@ -1261,7 +1427,7 @@
             <a:r>
               <a:rPr lang="en-US" sz="1200">
                 <a:solidFill>
-                  <a:srgbClr val="8b8b8b"/>
+                  <a:srgbClr val="8B8B8B"/>
                 </a:solidFill>
                 <a:latin typeface="Calibri"/>
               </a:rPr>
@@ -1292,6 +1458,7 @@
         </p:spPr>
         <p:txBody>
           <a:bodyPr anchor="ctr"/>
+          <a:lstStyle/>
           <a:p>
             <a:endParaRPr/>
           </a:p>
@@ -1318,6 +1485,7 @@
         </p:spPr>
         <p:txBody>
           <a:bodyPr anchor="ctr"/>
+          <a:lstStyle/>
           <a:p>
             <a:pPr algn="r">
               <a:lnSpc>
@@ -1327,11 +1495,11 @@
             <a:fld id="{AB3C28CB-0020-4E3A-9312-D38198B7F037}" type="slidenum">
               <a:rPr lang="en-US" sz="1200">
                 <a:solidFill>
-                  <a:srgbClr val="8b8b8b"/>
+                  <a:srgbClr val="8B8B8B"/>
                 </a:solidFill>
                 <a:latin typeface="Calibri"/>
               </a:rPr>
-              <a:t>&lt;number&gt;</a:t>
+              <a:t>‹#›</a:t>
             </a:fld>
             <a:endParaRPr/>
           </a:p>
@@ -1357,7 +1525,8 @@
           </a:prstGeom>
         </p:spPr>
         <p:txBody>
-          <a:bodyPr lIns="0" rIns="0" tIns="0" bIns="0"/>
+          <a:bodyPr lIns="0" tIns="0" rIns="0" bIns="0"/>
+          <a:lstStyle/>
           <a:p>
             <a:pPr>
               <a:buSzPct val="45000"/>
@@ -1460,26 +1629,31 @@
       </p:sp>
     </p:spTree>
   </p:cSld>
-  <p:clrMap bg1="lt1" bg2="lt2" tx1="dk1" tx2="dk2" accent1="accent1" accent2="accent2" accent3="accent3" accent4="accent4" accent5="accent5" accent6="accent6" hlink="hlink" folHlink="folHlink"/>
+  <p:clrMap bg1="lt1" tx1="dk1" bg2="lt2" tx2="dk2" accent1="accent1" accent2="accent2" accent3="accent3" accent4="accent4" accent5="accent5" accent6="accent6" hlink="hlink" folHlink="folHlink"/>
   <p:sldLayoutIdLst>
-    <p:sldLayoutId id="2147483649" r:id="rId2"/>
-    <p:sldLayoutId id="2147483650" r:id="rId3"/>
-    <p:sldLayoutId id="2147483651" r:id="rId4"/>
-    <p:sldLayoutId id="2147483652" r:id="rId5"/>
-    <p:sldLayoutId id="2147483653" r:id="rId6"/>
-    <p:sldLayoutId id="2147483654" r:id="rId7"/>
-    <p:sldLayoutId id="2147483655" r:id="rId8"/>
-    <p:sldLayoutId id="2147483656" r:id="rId9"/>
-    <p:sldLayoutId id="2147483657" r:id="rId10"/>
-    <p:sldLayoutId id="2147483658" r:id="rId11"/>
-    <p:sldLayoutId id="2147483659" r:id="rId12"/>
-    <p:sldLayoutId id="2147483660" r:id="rId13"/>
+    <p:sldLayoutId id="2147483649" r:id="rId1"/>
+    <p:sldLayoutId id="2147483650" r:id="rId2"/>
+    <p:sldLayoutId id="2147483651" r:id="rId3"/>
+    <p:sldLayoutId id="2147483652" r:id="rId4"/>
+    <p:sldLayoutId id="2147483653" r:id="rId5"/>
+    <p:sldLayoutId id="2147483654" r:id="rId6"/>
+    <p:sldLayoutId id="2147483655" r:id="rId7"/>
+    <p:sldLayoutId id="2147483656" r:id="rId8"/>
+    <p:sldLayoutId id="2147483657" r:id="rId9"/>
+    <p:sldLayoutId id="2147483658" r:id="rId10"/>
+    <p:sldLayoutId id="2147483659" r:id="rId11"/>
+    <p:sldLayoutId id="2147483660" r:id="rId12"/>
   </p:sldLayoutIdLst>
+  <p:txStyles>
+    <p:titleStyle/>
+    <p:bodyStyle/>
+    <p:otherStyle/>
+  </p:txStyles>
 </p:sldMaster>
 </file>
 
 <file path=ppt/slides/slide1.xml><?xml version="1.0" encoding="utf-8"?>
-<p:sld xmlns:a="http://schemas.openxmlformats.org/drawingml/2006/main" xmlns:p="http://schemas.openxmlformats.org/presentationml/2006/main" xmlns:r="http://schemas.openxmlformats.org/officeDocument/2006/relationships">
+<p:sld xmlns:a="http://schemas.openxmlformats.org/drawingml/2006/main" xmlns:r="http://schemas.openxmlformats.org/officeDocument/2006/relationships" xmlns:p="http://schemas.openxmlformats.org/presentationml/2006/main">
   <p:cSld>
     <p:spTree>
       <p:nvGrpSpPr>
@@ -1503,7 +1677,7 @@
         </p:nvSpPr>
         <p:spPr>
           <a:xfrm>
-            <a:off x="2511720" y="4648320"/>
+            <a:off x="-33240" y="6493320"/>
             <a:ext cx="4224240" cy="364680"/>
           </a:xfrm>
           <a:prstGeom prst="rect">
@@ -1515,7 +1689,8 @@
           </a:ln>
         </p:spPr>
         <p:txBody>
-          <a:bodyPr wrap="none" lIns="90000" rIns="90000" tIns="45000" bIns="45000"/>
+          <a:bodyPr wrap="none" lIns="90000" tIns="45000" rIns="90000" bIns="45000"/>
+          <a:lstStyle/>
           <a:p>
             <a:pPr>
               <a:lnSpc>
@@ -1523,26 +1698,53 @@
               </a:lnSpc>
             </a:pPr>
             <a:r>
-              <a:rPr lang="en-US">
+              <a:rPr lang="en-US" dirty="0" err="1">
                 <a:solidFill>
                   <a:srgbClr val="000000"/>
                 </a:solidFill>
                 <a:latin typeface="Calibri"/>
               </a:rPr>
-              <a:t>Bartholomeus et al. 2013 Eco. Lett.</a:t>
-            </a:r>
-            <a:endParaRPr/>
+              <a:t>Bartholomeus</a:t>
+            </a:r>
+            <a:r>
+              <a:rPr lang="en-US" dirty="0">
+                <a:solidFill>
+                  <a:srgbClr val="000000"/>
+                </a:solidFill>
+                <a:latin typeface="Calibri"/>
+              </a:rPr>
+              <a:t> et al. 2013 Eco. </a:t>
+            </a:r>
+            <a:r>
+              <a:rPr lang="en-US" dirty="0" err="1">
+                <a:solidFill>
+                  <a:srgbClr val="000000"/>
+                </a:solidFill>
+                <a:latin typeface="Calibri"/>
+              </a:rPr>
+              <a:t>Lett</a:t>
+            </a:r>
+            <a:r>
+              <a:rPr lang="en-US" dirty="0">
+                <a:solidFill>
+                  <a:srgbClr val="000000"/>
+                </a:solidFill>
+                <a:latin typeface="Calibri"/>
+              </a:rPr>
+              <a:t>.</a:t>
+            </a:r>
+            <a:endParaRPr dirty="0"/>
           </a:p>
         </p:txBody>
       </p:sp>
       <p:pic>
         <p:nvPicPr>
-          <p:cNvPr id="40" name="Picture 2" descr=""/>
+          <p:cNvPr id="40" name="Picture 2"/>
           <p:cNvPicPr/>
           <p:nvPr/>
         </p:nvPicPr>
         <p:blipFill>
-          <a:blip r:embed="rId1"/>
+          <a:blip r:embed="rId2"/>
           <a:stretch>
             <a:fillRect/>
           </a:stretch>
@@ -1562,6 +1764,9 @@
       </p:pic>
     </p:spTree>
   </p:cSld>
+  <p:clrMapOvr>
+    <a:masterClrMapping/>
+  </p:clrMapOvr>
   <p:timing>
     <p:tnLst>
       <p:par>
@@ -1570,14 +1775,14 @@
             <p:seq>
               <p:cTn id="2" nodeType="mainSeq"/>
               <p:prevCondLst>
-                <p:cond delay="0" evt="onPrev">
+                <p:cond evt="onPrev" delay="0">
                   <p:tgtEl>
                     <p:sldTgt/>
                   </p:tgtEl>
                 </p:cond>
               </p:prevCondLst>
               <p:nextCondLst>
-                <p:cond delay="0" evt="onNext">
+                <p:cond evt="onNext" delay="0">
                   <p:tgtEl>
                     <p:sldTgt/>
                   </p:tgtEl>
@@ -1593,7 +1798,7 @@
 </file>
 
 <file path=ppt/slides/slide2.xml><?xml version="1.0" encoding="utf-8"?>
-<p:sld xmlns:a="http://schemas.openxmlformats.org/drawingml/2006/main" xmlns:p="http://schemas.openxmlformats.org/presentationml/2006/main" xmlns:r="http://schemas.openxmlformats.org/officeDocument/2006/relationships">
+<p:sld xmlns:a="http://schemas.openxmlformats.org/drawingml/2006/main" xmlns:r="http://schemas.openxmlformats.org/officeDocument/2006/relationships" xmlns:p="http://schemas.openxmlformats.org/presentationml/2006/main">
   <p:cSld>
     <p:spTree>
       <p:nvGrpSpPr>
@@ -1617,7 +1822,7 @@
         </p:nvSpPr>
         <p:spPr>
           <a:xfrm>
-            <a:off x="3121920" y="5269320"/>
+            <a:off x="0" y="6493320"/>
             <a:ext cx="3357360" cy="364680"/>
           </a:xfrm>
           <a:prstGeom prst="rect">
@@ -1629,7 +1834,8 @@
           </a:ln>
         </p:spPr>
         <p:txBody>
-          <a:bodyPr wrap="none" lIns="90000" rIns="90000" tIns="45000" bIns="45000"/>
+          <a:bodyPr wrap="none" lIns="90000" tIns="45000" rIns="90000" bIns="45000"/>
+          <a:lstStyle/>
           <a:p>
             <a:pPr>
               <a:lnSpc>
@@ -1637,26 +1843,53 @@
               </a:lnSpc>
             </a:pPr>
             <a:r>
-              <a:rPr lang="en-US">
+              <a:rPr lang="en-US" dirty="0" err="1">
                 <a:solidFill>
                   <a:srgbClr val="000000"/>
                 </a:solidFill>
                 <a:latin typeface="Calibri"/>
               </a:rPr>
-              <a:t>Dostal et al. 2013 Eco. Lett.</a:t>
-            </a:r>
-            <a:endParaRPr/>
+              <a:t>Dostal</a:t>
+            </a:r>
+            <a:r>
+              <a:rPr lang="en-US" dirty="0">
+                <a:solidFill>
+                  <a:srgbClr val="000000"/>
+                </a:solidFill>
+                <a:latin typeface="Calibri"/>
+              </a:rPr>
+              <a:t> et al. 2013 Eco. </a:t>
+            </a:r>
+            <a:r>
+              <a:rPr lang="en-US" dirty="0" err="1">
+                <a:solidFill>
+                  <a:srgbClr val="000000"/>
+                </a:solidFill>
+                <a:latin typeface="Calibri"/>
+              </a:rPr>
+              <a:t>Lett</a:t>
+            </a:r>
+            <a:r>
+              <a:rPr lang="en-US" dirty="0">
+                <a:solidFill>
+                  <a:srgbClr val="000000"/>
+                </a:solidFill>
+                <a:latin typeface="Calibri"/>
+              </a:rPr>
+              <a:t>.</a:t>
+            </a:r>
+            <a:endParaRPr dirty="0"/>
           </a:p>
         </p:txBody>
       </p:sp>
       <p:pic>
         <p:nvPicPr>
-          <p:cNvPr id="42" name="Picture 2" descr=""/>
+          <p:cNvPr id="42" name="Picture 2"/>
           <p:cNvPicPr/>
           <p:nvPr/>
         </p:nvPicPr>
         <p:blipFill>
-          <a:blip r:embed="rId1"/>
+          <a:blip r:embed="rId2"/>
           <a:stretch>
             <a:fillRect/>
           </a:stretch>
@@ -1676,22 +1909,25 @@
       </p:pic>
     </p:spTree>
   </p:cSld>
+  <p:clrMapOvr>
+    <a:masterClrMapping/>
+  </p:clrMapOvr>
   <p:timing>
     <p:tnLst>
       <p:par>
-        <p:cTn id="3" dur="indefinite" restart="never" nodeType="tmRoot">
+        <p:cTn id="1" dur="indefinite" restart="never" nodeType="tmRoot">
           <p:childTnLst>
             <p:seq>
-              <p:cTn id="4" nodeType="mainSeq"/>
+              <p:cTn id="2" nodeType="mainSeq"/>
               <p:prevCondLst>
-                <p:cond delay="0" evt="onPrev">
+                <p:cond evt="onPrev" delay="0">
                   <p:tgtEl>
                     <p:sldTgt/>
                   </p:tgtEl>
                 </p:cond>
               </p:prevCondLst>
               <p:nextCondLst>
-                <p:cond delay="0" evt="onNext">
+                <p:cond evt="onNext" delay="0">
                   <p:tgtEl>
                     <p:sldTgt/>
                   </p:tgtEl>
@@ -1707,7 +1943,7 @@
 </file>
 
 <file path=ppt/slides/slide3.xml><?xml version="1.0" encoding="utf-8"?>
-<p:sld xmlns:a="http://schemas.openxmlformats.org/drawingml/2006/main" xmlns:p="http://schemas.openxmlformats.org/presentationml/2006/main" xmlns:r="http://schemas.openxmlformats.org/officeDocument/2006/relationships">
+<p:sld xmlns:a="http://schemas.openxmlformats.org/drawingml/2006/main" xmlns:r="http://schemas.openxmlformats.org/officeDocument/2006/relationships" xmlns:p="http://schemas.openxmlformats.org/presentationml/2006/main">
   <p:cSld>
     <p:spTree>
       <p:nvGrpSpPr>
@@ -1731,7 +1967,7 @@
         </p:nvSpPr>
         <p:spPr>
           <a:xfrm>
-            <a:off x="3776760" y="6488640"/>
+            <a:off x="0" y="6488640"/>
             <a:ext cx="5326200" cy="364680"/>
           </a:xfrm>
           <a:prstGeom prst="rect">
@@ -1743,7 +1979,8 @@
           </a:ln>
         </p:spPr>
         <p:txBody>
-          <a:bodyPr wrap="none" lIns="90000" rIns="90000" tIns="45000" bIns="45000"/>
+          <a:bodyPr wrap="none" lIns="90000" tIns="45000" rIns="90000" bIns="45000"/>
+          <a:lstStyle/>
           <a:p>
             <a:pPr>
               <a:lnSpc>
@@ -1751,26 +1988,89 @@
               </a:lnSpc>
             </a:pPr>
             <a:r>
-              <a:rPr lang="en-US">
+              <a:rPr lang="en-US" dirty="0" err="1">
                 <a:solidFill>
                   <a:srgbClr val="000000"/>
                 </a:solidFill>
                 <a:latin typeface="Calibri"/>
               </a:rPr>
-              <a:t>Belshe, Schurr &amp; Bolker et al. 2013 Eco. Lett.</a:t>
-            </a:r>
-            <a:endParaRPr/>
+              <a:t>Belshe</a:t>
+            </a:r>
+            <a:r>
+              <a:rPr lang="en-US" dirty="0">
+                <a:solidFill>
+                  <a:srgbClr val="000000"/>
+                </a:solidFill>
+                <a:latin typeface="Calibri"/>
+              </a:rPr>
+              <a:t>, </a:t>
+            </a:r>
+            <a:r>
+              <a:rPr lang="en-US" dirty="0" err="1">
+                <a:solidFill>
+                  <a:srgbClr val="000000"/>
+                </a:solidFill>
+                <a:latin typeface="Calibri"/>
+              </a:rPr>
+              <a:t>Schurr</a:t>
+            </a:r>
+            <a:r>
+              <a:rPr lang="en-US" dirty="0">
+                <a:solidFill>
+                  <a:srgbClr val="000000"/>
+                </a:solidFill>
+                <a:latin typeface="Calibri"/>
+              </a:rPr>
+              <a:t> &amp; </a:t>
+            </a:r>
+            <a:r>
+              <a:rPr lang="en-US" dirty="0" err="1">
+                <a:solidFill>
+                  <a:srgbClr val="000000"/>
+                </a:solidFill>
+                <a:latin typeface="Calibri"/>
+              </a:rPr>
+              <a:t>Bolker</a:t>
+            </a:r>
+            <a:r>
+              <a:rPr lang="en-US" dirty="0">
+                <a:solidFill>
+                  <a:srgbClr val="000000"/>
+                </a:solidFill>
+                <a:latin typeface="Calibri"/>
+              </a:rPr>
+              <a:t> et al. 2013 Eco. </a:t>
+            </a:r>
+            <a:r>
+              <a:rPr lang="en-US" dirty="0" err="1">
+                <a:solidFill>
+                  <a:srgbClr val="000000"/>
+                </a:solidFill>
+                <a:latin typeface="Calibri"/>
+              </a:rPr>
+              <a:t>Lett</a:t>
+            </a:r>
+            <a:r>
+              <a:rPr lang="en-US" dirty="0">
+                <a:solidFill>
+                  <a:srgbClr val="000000"/>
+                </a:solidFill>
+                <a:latin typeface="Calibri"/>
+              </a:rPr>
+              <a:t>.</a:t>
+            </a:r>
+            <a:endParaRPr dirty="0"/>
           </a:p>
         </p:txBody>
       </p:sp>
       <p:pic>
         <p:nvPicPr>
-          <p:cNvPr id="44" name="Picture 3" descr=""/>
+          <p:cNvPr id="44" name="Picture 3"/>
           <p:cNvPicPr/>
           <p:nvPr/>
         </p:nvPicPr>
         <p:blipFill>
-          <a:blip r:embed="rId1"/>
+          <a:blip r:embed="rId2"/>
           <a:stretch>
             <a:fillRect/>
           </a:stretch>
@@ -1790,22 +2090,25 @@
       </p:pic>
     </p:spTree>
   </p:cSld>
+  <p:clrMapOvr>
+    <a:masterClrMapping/>
+  </p:clrMapOvr>
   <p:timing>
     <p:tnLst>
       <p:par>
-        <p:cTn id="5" dur="indefinite" restart="never" nodeType="tmRoot">
+        <p:cTn id="1" dur="indefinite" restart="never" nodeType="tmRoot">
           <p:childTnLst>
             <p:seq>
-              <p:cTn id="6" nodeType="mainSeq"/>
+              <p:cTn id="2" nodeType="mainSeq"/>
               <p:prevCondLst>
-                <p:cond delay="0" evt="onPrev">
+                <p:cond evt="onPrev" delay="0">
                   <p:tgtEl>
                     <p:sldTgt/>
                   </p:tgtEl>
                 </p:cond>
               </p:prevCondLst>
               <p:nextCondLst>
-                <p:cond delay="0" evt="onNext">
+                <p:cond evt="onNext" delay="0">
                   <p:tgtEl>
                     <p:sldTgt/>
                   </p:tgtEl>
@@ -1821,7 +2124,7 @@
 </file>
 
 <file path=ppt/slides/slide4.xml><?xml version="1.0" encoding="utf-8"?>
-<p:sld xmlns:a="http://schemas.openxmlformats.org/drawingml/2006/main" xmlns:p="http://schemas.openxmlformats.org/presentationml/2006/main" xmlns:r="http://schemas.openxmlformats.org/officeDocument/2006/relationships">
+<p:sld xmlns:a="http://schemas.openxmlformats.org/drawingml/2006/main" xmlns:r="http://schemas.openxmlformats.org/officeDocument/2006/relationships" xmlns:p="http://schemas.openxmlformats.org/presentationml/2006/main">
   <p:cSld>
     <p:spTree>
       <p:nvGrpSpPr>
@@ -1839,12 +2142,12 @@
       </p:grpSpPr>
       <p:pic>
         <p:nvPicPr>
-          <p:cNvPr id="45" name="Picture 2" descr=""/>
+          <p:cNvPr id="45" name="Picture 2"/>
           <p:cNvPicPr/>
           <p:nvPr/>
         </p:nvPicPr>
         <p:blipFill>
-          <a:blip r:embed="rId1"/>
+          <a:blip r:embed="rId2"/>
           <a:stretch>
             <a:fillRect/>
           </a:stretch>
@@ -1870,7 +2173,7 @@
         </p:nvSpPr>
         <p:spPr>
           <a:xfrm>
-            <a:off x="4764600" y="6488640"/>
+            <a:off x="0" y="6488640"/>
             <a:ext cx="4394880" cy="364680"/>
           </a:xfrm>
           <a:prstGeom prst="rect">
@@ -1882,7 +2185,8 @@
           </a:ln>
         </p:spPr>
         <p:txBody>
-          <a:bodyPr wrap="none" lIns="90000" rIns="90000" tIns="45000" bIns="45000"/>
+          <a:bodyPr wrap="none" lIns="90000" tIns="45000" rIns="90000" bIns="45000"/>
+          <a:lstStyle/>
           <a:p>
             <a:pPr>
               <a:lnSpc>
@@ -1890,36 +2194,66 @@
               </a:lnSpc>
             </a:pPr>
             <a:r>
-              <a:rPr lang="en-US">
+              <a:rPr lang="en-US" dirty="0" err="1">
                 <a:solidFill>
                   <a:srgbClr val="000000"/>
                 </a:solidFill>
                 <a:latin typeface="Calibri"/>
               </a:rPr>
-              <a:t>Morueta-Holme et al. 2013 Eco. Lett.</a:t>
-            </a:r>
-            <a:endParaRPr/>
+              <a:t>Morueta-Holme</a:t>
+            </a:r>
+            <a:r>
+              <a:rPr lang="en-US" dirty="0">
+                <a:solidFill>
+                  <a:srgbClr val="000000"/>
+                </a:solidFill>
+                <a:latin typeface="Calibri"/>
+              </a:rPr>
+              <a:t> et al. 2013 Eco. </a:t>
+            </a:r>
+            <a:r>
+              <a:rPr lang="en-US" dirty="0" err="1">
+                <a:solidFill>
+                  <a:srgbClr val="000000"/>
+                </a:solidFill>
+                <a:latin typeface="Calibri"/>
+              </a:rPr>
+              <a:t>Lett</a:t>
+            </a:r>
+            <a:r>
+              <a:rPr lang="en-US" dirty="0">
+                <a:solidFill>
+                  <a:srgbClr val="000000"/>
+                </a:solidFill>
+                <a:latin typeface="Calibri"/>
+              </a:rPr>
+              <a:t>.</a:t>
+            </a:r>
+            <a:endParaRPr dirty="0"/>
           </a:p>
         </p:txBody>
       </p:sp>
     </p:spTree>
   </p:cSld>
+  <p:clrMapOvr>
+    <a:masterClrMapping/>
+  </p:clrMapOvr>
   <p:timing>
     <p:tnLst>
       <p:par>
-        <p:cTn id="7" dur="indefinite" restart="never" nodeType="tmRoot">
+        <p:cTn id="1" dur="indefinite" restart="never" nodeType="tmRoot">
           <p:childTnLst>
             <p:seq>
-              <p:cTn id="8" nodeType="mainSeq"/>
+              <p:cTn id="2" nodeType="mainSeq"/>
               <p:prevCondLst>
-                <p:cond delay="0" evt="onPrev">
+                <p:cond evt="onPrev" delay="0">
                   <p:tgtEl>
                     <p:sldTgt/>
                   </p:tgtEl>
                 </p:cond>
               </p:prevCondLst>
               <p:nextCondLst>
-                <p:cond delay="0" evt="onNext">
+                <p:cond evt="onNext" delay="0">
                   <p:tgtEl>
                     <p:sldTgt/>
                   </p:tgtEl>
@@ -1935,7 +2269,7 @@
 </file>
 
 <file path=ppt/slides/slide5.xml><?xml version="1.0" encoding="utf-8"?>
-<p:sld xmlns:a="http://schemas.openxmlformats.org/drawingml/2006/main" xmlns:p="http://schemas.openxmlformats.org/presentationml/2006/main" xmlns:r="http://schemas.openxmlformats.org/officeDocument/2006/relationships">
+<p:sld xmlns:a="http://schemas.openxmlformats.org/drawingml/2006/main" xmlns:r="http://schemas.openxmlformats.org/officeDocument/2006/relationships" xmlns:p="http://schemas.openxmlformats.org/presentationml/2006/main">
   <p:cSld>
     <p:spTree>
       <p:nvGrpSpPr>
@@ -1959,7 +2293,7 @@
         </p:nvSpPr>
         <p:spPr>
           <a:xfrm>
-            <a:off x="129600" y="6426000"/>
+            <a:off x="0" y="6493320"/>
             <a:ext cx="2705040" cy="364680"/>
           </a:xfrm>
           <a:prstGeom prst="rect">
@@ -1971,7 +2305,8 @@
           </a:ln>
         </p:spPr>
         <p:txBody>
-          <a:bodyPr wrap="none" lIns="90000" rIns="90000" tIns="45000" bIns="45000"/>
+          <a:bodyPr wrap="none" lIns="90000" tIns="45000" rIns="90000" bIns="45000"/>
+          <a:lstStyle/>
           <a:p>
             <a:pPr>
               <a:lnSpc>
@@ -1979,26 +2314,35 @@
               </a:lnSpc>
             </a:pPr>
             <a:r>
-              <a:rPr lang="en-US">
+              <a:rPr lang="en-US" dirty="0" err="1">
                 <a:solidFill>
                   <a:srgbClr val="000000"/>
                 </a:solidFill>
                 <a:latin typeface="Calibri"/>
               </a:rPr>
-              <a:t>Saltre et al. 2013 GEB</a:t>
-            </a:r>
-            <a:endParaRPr/>
+              <a:t>Saltre</a:t>
+            </a:r>
+            <a:r>
+              <a:rPr lang="en-US" dirty="0">
+                <a:solidFill>
+                  <a:srgbClr val="000000"/>
+                </a:solidFill>
+                <a:latin typeface="Calibri"/>
+              </a:rPr>
+              <a:t> et al. 2013 GEB</a:t>
+            </a:r>
+            <a:endParaRPr dirty="0"/>
           </a:p>
         </p:txBody>
       </p:sp>
       <p:pic>
         <p:nvPicPr>
-          <p:cNvPr id="48" name="Picture 2" descr=""/>
+          <p:cNvPr id="48" name="Picture 2"/>
           <p:cNvPicPr/>
           <p:nvPr/>
         </p:nvPicPr>
         <p:blipFill>
-          <a:blip r:embed="rId1"/>
+          <a:blip r:embed="rId2"/>
           <a:stretch>
             <a:fillRect/>
           </a:stretch>
@@ -2018,22 +2362,25 @@
       </p:pic>
     </p:spTree>
   </p:cSld>
+  <p:clrMapOvr>
+    <a:masterClrMapping/>
+  </p:clrMapOvr>
   <p:timing>
     <p:tnLst>
       <p:par>
-        <p:cTn id="9" dur="indefinite" restart="never" nodeType="tmRoot">
+        <p:cTn id="1" dur="indefinite" restart="never" nodeType="tmRoot">
           <p:childTnLst>
             <p:seq>
-              <p:cTn id="10" nodeType="mainSeq"/>
+              <p:cTn id="2" nodeType="mainSeq"/>
               <p:prevCondLst>
-                <p:cond delay="0" evt="onPrev">
+                <p:cond evt="onPrev" delay="0">
                   <p:tgtEl>
                     <p:sldTgt/>
                   </p:tgtEl>
                 </p:cond>
               </p:prevCondLst>
               <p:nextCondLst>
-                <p:cond delay="0" evt="onNext">
+                <p:cond evt="onNext" delay="0">
                   <p:tgtEl>
                     <p:sldTgt/>
                   </p:tgtEl>
@@ -2049,7 +2396,7 @@
 </file>
 
 <file path=ppt/slides/slide6.xml><?xml version="1.0" encoding="utf-8"?>
-<p:sld xmlns:a="http://schemas.openxmlformats.org/drawingml/2006/main" xmlns:p="http://schemas.openxmlformats.org/presentationml/2006/main" xmlns:r="http://schemas.openxmlformats.org/officeDocument/2006/relationships">
+<p:sld xmlns:a="http://schemas.openxmlformats.org/drawingml/2006/main" xmlns:r="http://schemas.openxmlformats.org/officeDocument/2006/relationships" xmlns:p="http://schemas.openxmlformats.org/presentationml/2006/main">
   <p:cSld>
     <p:spTree>
       <p:nvGrpSpPr>
@@ -2067,13 +2414,13 @@
       </p:grpSpPr>
       <p:pic>
         <p:nvPicPr>
-          <p:cNvPr id="49" name="Picture 2" descr=""/>
+          <p:cNvPr id="49" name="Picture 2"/>
           <p:cNvPicPr/>
           <p:nvPr/>
         </p:nvPicPr>
         <p:blipFill>
-          <a:blip r:embed="rId1"/>
-          <a:srcRect l="0" t="35116" r="0" b="0"/>
+          <a:blip r:embed="rId2"/>
+          <a:srcRect t="35116"/>
           <a:stretch>
             <a:fillRect/>
           </a:stretch>
@@ -2099,7 +2446,7 @@
         </p:nvSpPr>
         <p:spPr>
           <a:xfrm>
-            <a:off x="6162840" y="6488640"/>
+            <a:off x="0" y="6488640"/>
             <a:ext cx="2954880" cy="364680"/>
           </a:xfrm>
           <a:prstGeom prst="rect">
@@ -2111,7 +2458,8 @@
           </a:ln>
         </p:spPr>
         <p:txBody>
-          <a:bodyPr wrap="none" lIns="90000" rIns="90000" tIns="45000" bIns="45000"/>
+          <a:bodyPr wrap="none" lIns="90000" tIns="45000" rIns="90000" bIns="45000"/>
+          <a:lstStyle/>
           <a:p>
             <a:pPr>
               <a:lnSpc>
@@ -2119,7 +2467,7 @@
               </a:lnSpc>
             </a:pPr>
             <a:r>
-              <a:rPr lang="en-US">
+              <a:rPr lang="en-US" dirty="0">
                 <a:solidFill>
                   <a:srgbClr val="000000"/>
                 </a:solidFill>
@@ -2127,28 +2475,31 @@
               </a:rPr>
               <a:t>Bhatt et al. 2013 Nature</a:t>
             </a:r>
-            <a:endParaRPr/>
+            <a:endParaRPr dirty="0"/>
           </a:p>
         </p:txBody>
       </p:sp>
     </p:spTree>
   </p:cSld>
+  <p:clrMapOvr>
+    <a:masterClrMapping/>
+  </p:clrMapOvr>
   <p:timing>
     <p:tnLst>
       <p:par>
-        <p:cTn id="11" dur="indefinite" restart="never" nodeType="tmRoot">
+        <p:cTn id="1" dur="indefinite" restart="never" nodeType="tmRoot">
           <p:childTnLst>
             <p:seq>
-              <p:cTn id="12" nodeType="mainSeq"/>
+              <p:cTn id="2" nodeType="mainSeq"/>
               <p:prevCondLst>
-                <p:cond delay="0" evt="onPrev">
+                <p:cond evt="onPrev" delay="0">
                   <p:tgtEl>
                     <p:sldTgt/>
                   </p:tgtEl>
                 </p:cond>
               </p:prevCondLst>
               <p:nextCondLst>
-                <p:cond delay="0" evt="onNext">
+                <p:cond evt="onNext" delay="0">
                   <p:tgtEl>
                     <p:sldTgt/>
                   </p:tgtEl>
@@ -2164,7 +2515,7 @@
 </file>
 
 <file path=ppt/slides/slide7.xml><?xml version="1.0" encoding="utf-8"?>
-<p:sld xmlns:a="http://schemas.openxmlformats.org/drawingml/2006/main" xmlns:p="http://schemas.openxmlformats.org/presentationml/2006/main" xmlns:r="http://schemas.openxmlformats.org/officeDocument/2006/relationships">
+<p:sld xmlns:a="http://schemas.openxmlformats.org/drawingml/2006/main" xmlns:r="http://schemas.openxmlformats.org/officeDocument/2006/relationships" xmlns:p="http://schemas.openxmlformats.org/presentationml/2006/main">
   <p:cSld>
     <p:spTree>
       <p:nvGrpSpPr>
@@ -2182,32 +2533,7 @@
       </p:grpSpPr>
       <p:pic>
         <p:nvPicPr>
-          <p:cNvPr id="51" name="Picture 3" descr=""/>
-          <p:cNvPicPr/>
-          <p:nvPr/>
-        </p:nvPicPr>
-        <p:blipFill>
-          <a:blip r:embed="rId1"/>
-          <a:stretch>
-            <a:fillRect/>
-          </a:stretch>
-        </p:blipFill>
-        <p:spPr>
-          <a:xfrm>
-            <a:off x="762120" y="0"/>
-            <a:ext cx="7314840" cy="2952360"/>
-          </a:xfrm>
-          <a:prstGeom prst="rect">
-            <a:avLst/>
-          </a:prstGeom>
-          <a:ln w="9360">
-            <a:noFill/>
-          </a:ln>
-        </p:spPr>
-      </p:pic>
-      <p:pic>
-        <p:nvPicPr>
-          <p:cNvPr id="52" name="Picture 4" descr=""/>
+          <p:cNvPr id="51" name="Picture 3"/>
           <p:cNvPicPr/>
           <p:nvPr/>
         </p:nvPicPr>
@@ -2219,8 +2545,8 @@
         </p:blipFill>
         <p:spPr>
           <a:xfrm>
-            <a:off x="3586320" y="2895480"/>
-            <a:ext cx="3804480" cy="3885840"/>
+            <a:off x="762120" y="0"/>
+            <a:ext cx="7314840" cy="2952360"/>
           </a:xfrm>
           <a:prstGeom prst="rect">
             <a:avLst/>
@@ -2230,6 +2556,31 @@
           </a:ln>
         </p:spPr>
       </p:pic>
+      <p:pic>
+        <p:nvPicPr>
+          <p:cNvPr id="52" name="Picture 4"/>
+          <p:cNvPicPr/>
+          <p:nvPr/>
+        </p:nvPicPr>
+        <p:blipFill>
+          <a:blip r:embed="rId3"/>
+          <a:stretch>
+            <a:fillRect/>
+          </a:stretch>
+        </p:blipFill>
+        <p:spPr>
+          <a:xfrm>
+            <a:off x="3586320" y="2895480"/>
+            <a:ext cx="3804480" cy="3885840"/>
+          </a:xfrm>
+          <a:prstGeom prst="rect">
+            <a:avLst/>
+          </a:prstGeom>
+          <a:ln w="9360">
+            <a:noFill/>
+          </a:ln>
+        </p:spPr>
+      </p:pic>
       <p:sp>
         <p:nvSpPr>
           <p:cNvPr id="53" name="CustomShape 1"/>
@@ -2238,7 +2589,7 @@
         </p:nvSpPr>
         <p:spPr>
           <a:xfrm>
-            <a:off x="-4320" y="6400800"/>
+            <a:off x="-4320" y="6493320"/>
             <a:ext cx="2566080" cy="364680"/>
           </a:xfrm>
           <a:prstGeom prst="rect">
@@ -2250,7 +2601,8 @@
           </a:ln>
         </p:spPr>
         <p:txBody>
-          <a:bodyPr wrap="none" lIns="90000" rIns="90000" tIns="45000" bIns="45000"/>
+          <a:bodyPr wrap="none" lIns="90000" tIns="45000" rIns="90000" bIns="45000"/>
+          <a:lstStyle/>
           <a:p>
             <a:pPr>
               <a:lnSpc>
@@ -2258,7 +2610,7 @@
               </a:lnSpc>
             </a:pPr>
             <a:r>
-              <a:rPr lang="en-US">
+              <a:rPr lang="en-US" dirty="0">
                 <a:solidFill>
                   <a:srgbClr val="000000"/>
                 </a:solidFill>
@@ -2266,28 +2618,31 @@
               </a:rPr>
               <a:t>Qian et al. 2013 GEB</a:t>
             </a:r>
-            <a:endParaRPr/>
+            <a:endParaRPr dirty="0"/>
           </a:p>
         </p:txBody>
       </p:sp>
     </p:spTree>
   </p:cSld>
+  <p:clrMapOvr>
+    <a:masterClrMapping/>
+  </p:clrMapOvr>
   <p:timing>
     <p:tnLst>
       <p:par>
-        <p:cTn id="13" dur="indefinite" restart="never" nodeType="tmRoot">
+        <p:cTn id="1" dur="indefinite" restart="never" nodeType="tmRoot">
           <p:childTnLst>
             <p:seq>
-              <p:cTn id="14" nodeType="mainSeq"/>
+              <p:cTn id="2" nodeType="mainSeq"/>
               <p:prevCondLst>
-                <p:cond delay="0" evt="onPrev">
+                <p:cond evt="onPrev" delay="0">
                   <p:tgtEl>
                     <p:sldTgt/>
                   </p:tgtEl>
                 </p:cond>
               </p:prevCondLst>
               <p:nextCondLst>
-                <p:cond delay="0" evt="onNext">
+                <p:cond evt="onNext" delay="0">
                   <p:tgtEl>
                     <p:sldTgt/>
                   </p:tgtEl>
@@ -2303,7 +2658,7 @@
 </file>
 
 <file path=ppt/slides/slide8.xml><?xml version="1.0" encoding="utf-8"?>
-<p:sld xmlns:a="http://schemas.openxmlformats.org/drawingml/2006/main" xmlns:p="http://schemas.openxmlformats.org/presentationml/2006/main" xmlns:r="http://schemas.openxmlformats.org/officeDocument/2006/relationships">
+<p:sld xmlns:a="http://schemas.openxmlformats.org/drawingml/2006/main" xmlns:r="http://schemas.openxmlformats.org/officeDocument/2006/relationships" xmlns:p="http://schemas.openxmlformats.org/presentationml/2006/main">
   <p:cSld>
     <p:spTree>
       <p:nvGrpSpPr>
@@ -2327,7 +2682,7 @@
         </p:nvSpPr>
         <p:spPr>
           <a:xfrm>
-            <a:off x="91440" y="6401880"/>
+            <a:off x="0" y="6493320"/>
             <a:ext cx="3296160" cy="364680"/>
           </a:xfrm>
           <a:prstGeom prst="rect">
@@ -2339,7 +2694,8 @@
           </a:ln>
         </p:spPr>
         <p:txBody>
-          <a:bodyPr wrap="none" lIns="90000" rIns="90000" tIns="45000" bIns="45000"/>
+          <a:bodyPr wrap="none" lIns="90000" tIns="45000" rIns="90000" bIns="45000"/>
+          <a:lstStyle/>
           <a:p>
             <a:pPr>
               <a:lnSpc>
@@ -2347,26 +2703,35 @@
               </a:lnSpc>
             </a:pPr>
             <a:r>
-              <a:rPr lang="en-US">
+              <a:rPr lang="en-US" dirty="0" err="1">
                 <a:solidFill>
                   <a:srgbClr val="000000"/>
                 </a:solidFill>
                 <a:latin typeface="Calibri"/>
               </a:rPr>
-              <a:t>Vanderwell et al. 2013 GEB</a:t>
-            </a:r>
-            <a:endParaRPr/>
+              <a:t>Vanderwell</a:t>
+            </a:r>
+            <a:r>
+              <a:rPr lang="en-US" dirty="0">
+                <a:solidFill>
+                  <a:srgbClr val="000000"/>
+                </a:solidFill>
+                <a:latin typeface="Calibri"/>
+              </a:rPr>
+              <a:t> et al. 2013 GEB</a:t>
+            </a:r>
+            <a:endParaRPr dirty="0"/>
           </a:p>
         </p:txBody>
       </p:sp>
       <p:pic>
         <p:nvPicPr>
-          <p:cNvPr id="55" name="Picture 2" descr=""/>
+          <p:cNvPr id="55" name="Picture 2"/>
           <p:cNvPicPr/>
           <p:nvPr/>
         </p:nvPicPr>
         <p:blipFill>
-          <a:blip r:embed="rId1"/>
+          <a:blip r:embed="rId2"/>
           <a:stretch>
             <a:fillRect/>
           </a:stretch>
@@ -2386,22 +2751,25 @@
       </p:pic>
     </p:spTree>
   </p:cSld>
+  <p:clrMapOvr>
+    <a:masterClrMapping/>
+  </p:clrMapOvr>
   <p:timing>
     <p:tnLst>
       <p:par>
-        <p:cTn id="15" dur="indefinite" restart="never" nodeType="tmRoot">
+        <p:cTn id="1" dur="indefinite" restart="never" nodeType="tmRoot">
           <p:childTnLst>
             <p:seq>
-              <p:cTn id="16" nodeType="mainSeq"/>
+              <p:cTn id="2" nodeType="mainSeq"/>
               <p:prevCondLst>
-                <p:cond delay="0" evt="onPrev">
+                <p:cond evt="onPrev" delay="0">
                   <p:tgtEl>
                     <p:sldTgt/>
                   </p:tgtEl>
                 </p:cond>
               </p:prevCondLst>
               <p:nextCondLst>
-                <p:cond delay="0" evt="onNext">
+                <p:cond evt="onNext" delay="0">
                   <p:tgtEl>
                     <p:sldTgt/>
                   </p:tgtEl>
@@ -2636,5 +3004,7 @@
       </a:bgFillStyleLst>
     </a:fmtScheme>
   </a:themeElements>
+  <a:objectDefaults/>
+  <a:extraClrSchemeLst/>
 </a:theme>
 </file>
</xml_diff>